<commit_message>
Change FontSize of PPT
</commit_message>
<xml_diff>
--- a/PPT/01-Accenture-FS-Angular-Introduce.pptx
+++ b/PPT/01-Accenture-FS-Angular-Introduce.pptx
@@ -16004,14 +16004,14 @@
           <p:nvPr>
             <p:extLst>
               <p:ext uri="{D42A27DB-BD31-4B8C-83A1-F6EECF244321}">
-                <p14:modId xmlns:p14="http://schemas.microsoft.com/office/powerpoint/2010/main" val="3221812355"/>
+                <p14:modId xmlns:p14="http://schemas.microsoft.com/office/powerpoint/2010/main" val="4057627125"/>
               </p:ext>
             </p:extLst>
           </p:nvPr>
         </p:nvGraphicFramePr>
         <p:xfrm>
           <a:off x="449263" y="1254111"/>
-          <a:ext cx="8535346" cy="1821342"/>
+          <a:ext cx="8535346" cy="2359017"/>
         </p:xfrm>
         <a:graphic>
           <a:graphicData uri="http://schemas.openxmlformats.org/drawingml/2006/table">
@@ -16166,21 +16166,7 @@
                           <a:latin typeface="SimSun" panose="02010600030101010101" pitchFamily="2" charset="-122"/>
                           <a:ea typeface="SimSun" panose="02010600030101010101" pitchFamily="2" charset="-122"/>
                         </a:rPr>
-                        <a:t>网页中能够正常启动</a:t>
-                      </a:r>
-                      <a:r>
-                        <a:rPr lang="en-US" altLang="zh-CN" sz="1400" b="0" dirty="0">
-                          <a:latin typeface="SimSun" panose="02010600030101010101" pitchFamily="2" charset="-122"/>
-                          <a:ea typeface="SimSun" panose="02010600030101010101" pitchFamily="2" charset="-122"/>
-                        </a:rPr>
-                        <a:t>Angular</a:t>
-                      </a:r>
-                      <a:r>
-                        <a:rPr lang="zh-CN" altLang="en-US" sz="1400" b="0" dirty="0">
-                          <a:latin typeface="SimSun" panose="02010600030101010101" pitchFamily="2" charset="-122"/>
-                          <a:ea typeface="SimSun" panose="02010600030101010101" pitchFamily="2" charset="-122"/>
-                        </a:rPr>
-                        <a:t>。</a:t>
+                        <a:t>所需软件本地安装完毕</a:t>
                       </a:r>
                       <a:endParaRPr lang="en-US" sz="1400" b="0" dirty="0">
                         <a:latin typeface="SimSun" panose="02010600030101010101" pitchFamily="2" charset="-122"/>
@@ -16193,6 +16179,128 @@
                 <a:extLst>
                   <a:ext uri="{0D108BD9-81ED-4DB2-BD59-A6C34878D82A}">
                     <a16:rowId xmlns:a16="http://schemas.microsoft.com/office/drawing/2014/main" val="4026608687"/>
+                  </a:ext>
+                </a:extLst>
+              </a:tr>
+              <a:tr h="537675">
+                <a:tc>
+                  <a:txBody>
+                    <a:bodyPr/>
+                    <a:lstStyle/>
+                    <a:p>
+                      <a:pPr algn="ctr"/>
+                      <a:r>
+                        <a:rPr lang="en-US" altLang="zh-CN" sz="1400" b="0" dirty="0">
+                          <a:latin typeface="SimSun" panose="02010600030101010101" pitchFamily="2" charset="-122"/>
+                          <a:ea typeface="SimSun" panose="02010600030101010101" pitchFamily="2" charset="-122"/>
+                        </a:rPr>
+                        <a:t>Angular CLI</a:t>
+                      </a:r>
+                      <a:r>
+                        <a:rPr lang="zh-CN" altLang="en-US" sz="1400" b="0" dirty="0">
+                          <a:latin typeface="SimSun" panose="02010600030101010101" pitchFamily="2" charset="-122"/>
+                          <a:ea typeface="SimSun" panose="02010600030101010101" pitchFamily="2" charset="-122"/>
+                        </a:rPr>
+                        <a:t>项目搭建</a:t>
+                      </a:r>
+                      <a:endParaRPr lang="en-US" sz="1400" b="0" dirty="0">
+                        <a:latin typeface="SimSun" panose="02010600030101010101" pitchFamily="2" charset="-122"/>
+                        <a:ea typeface="SimSun" panose="02010600030101010101" pitchFamily="2" charset="-122"/>
+                      </a:endParaRPr>
+                    </a:p>
+                  </a:txBody>
+                  <a:tcPr anchor="ctr"/>
+                </a:tc>
+                <a:tc>
+                  <a:txBody>
+                    <a:bodyPr/>
+                    <a:lstStyle/>
+                    <a:p>
+                      <a:pPr algn="ctr"/>
+                      <a:r>
+                        <a:rPr lang="zh-CN" altLang="en-US" sz="1400" b="0" dirty="0">
+                          <a:latin typeface="SimSun" panose="02010600030101010101" pitchFamily="2" charset="-122"/>
+                          <a:ea typeface="SimSun" panose="02010600030101010101" pitchFamily="2" charset="-122"/>
+                        </a:rPr>
+                        <a:t>使用</a:t>
+                      </a:r>
+                      <a:r>
+                        <a:rPr lang="en-US" altLang="zh-CN" sz="1400" b="0" dirty="0">
+                          <a:latin typeface="SimSun" panose="02010600030101010101" pitchFamily="2" charset="-122"/>
+                          <a:ea typeface="SimSun" panose="02010600030101010101" pitchFamily="2" charset="-122"/>
+                        </a:rPr>
+                        <a:t>CLI</a:t>
+                      </a:r>
+                      <a:r>
+                        <a:rPr lang="zh-CN" altLang="en-US" sz="1400" b="0" dirty="0">
+                          <a:latin typeface="SimSun" panose="02010600030101010101" pitchFamily="2" charset="-122"/>
+                          <a:ea typeface="SimSun" panose="02010600030101010101" pitchFamily="2" charset="-122"/>
+                        </a:rPr>
+                        <a:t>命令</a:t>
+                      </a:r>
+                      <a:endParaRPr lang="en-US" altLang="zh-CN" sz="1400" b="0" dirty="0">
+                        <a:latin typeface="SimSun" panose="02010600030101010101" pitchFamily="2" charset="-122"/>
+                        <a:ea typeface="SimSun" panose="02010600030101010101" pitchFamily="2" charset="-122"/>
+                      </a:endParaRPr>
+                    </a:p>
+                    <a:p>
+                      <a:pPr algn="ctr"/>
+                      <a:r>
+                        <a:rPr lang="zh-CN" altLang="en-US" sz="1400" b="0" dirty="0">
+                          <a:latin typeface="SimSun" panose="02010600030101010101" pitchFamily="2" charset="-122"/>
+                          <a:ea typeface="SimSun" panose="02010600030101010101" pitchFamily="2" charset="-122"/>
+                        </a:rPr>
+                        <a:t>创建</a:t>
+                      </a:r>
+                      <a:r>
+                        <a:rPr lang="en-US" altLang="zh-CN" sz="1400" b="0" dirty="0">
+                          <a:latin typeface="SimSun" panose="02010600030101010101" pitchFamily="2" charset="-122"/>
+                          <a:ea typeface="SimSun" panose="02010600030101010101" pitchFamily="2" charset="-122"/>
+                        </a:rPr>
+                        <a:t>Angular Sample</a:t>
+                      </a:r>
+                      <a:r>
+                        <a:rPr lang="zh-CN" altLang="en-US" sz="1400" b="0" dirty="0">
+                          <a:latin typeface="SimSun" panose="02010600030101010101" pitchFamily="2" charset="-122"/>
+                          <a:ea typeface="SimSun" panose="02010600030101010101" pitchFamily="2" charset="-122"/>
+                        </a:rPr>
+                        <a:t>项目</a:t>
+                      </a:r>
+                      <a:endParaRPr lang="en-US" altLang="ja-JP" sz="1400" b="0" dirty="0">
+                        <a:latin typeface="SimSun" panose="02010600030101010101" pitchFamily="2" charset="-122"/>
+                        <a:ea typeface="SimSun" panose="02010600030101010101" pitchFamily="2" charset="-122"/>
+                      </a:endParaRPr>
+                    </a:p>
+                  </a:txBody>
+                  <a:tcPr anchor="ctr"/>
+                </a:tc>
+                <a:tc>
+                  <a:txBody>
+                    <a:bodyPr/>
+                    <a:lstStyle/>
+                    <a:p>
+                      <a:pPr algn="l"/>
+                      <a:r>
+                        <a:rPr lang="zh-CN" altLang="en-US" sz="1400" b="0" dirty="0">
+                          <a:latin typeface="SimSun" panose="02010600030101010101" pitchFamily="2" charset="-122"/>
+                          <a:ea typeface="SimSun" panose="02010600030101010101" pitchFamily="2" charset="-122"/>
+                        </a:rPr>
+                        <a:t>网页中能够正常启动</a:t>
+                      </a:r>
+                      <a:r>
+                        <a:rPr lang="en-US" altLang="zh-CN" sz="1400" b="0" dirty="0">
+                          <a:latin typeface="SimSun" panose="02010600030101010101" pitchFamily="2" charset="-122"/>
+                          <a:ea typeface="SimSun" panose="02010600030101010101" pitchFamily="2" charset="-122"/>
+                        </a:rPr>
+                        <a:t>App</a:t>
+                      </a:r>
+                    </a:p>
+                  </a:txBody>
+                  <a:tcPr anchor="ctr"/>
+                </a:tc>
+                <a:extLst>
+                  <a:ext uri="{0D108BD9-81ED-4DB2-BD59-A6C34878D82A}">
+                    <a16:rowId xmlns:a16="http://schemas.microsoft.com/office/drawing/2014/main" val="3808931876"/>
                   </a:ext>
                 </a:extLst>
               </a:tr>
@@ -16624,7 +16732,7 @@
           <a:p>
             <a:pPr eaLnBrk="1" hangingPunct="1"/>
             <a:r>
-              <a:rPr lang="en-US" dirty="0"/>
+              <a:rPr lang="en-US" sz="2800" dirty="0"/>
               <a:t>Agenda</a:t>
             </a:r>
           </a:p>
@@ -16639,14 +16747,14 @@
           <p:nvPr>
             <p:extLst>
               <p:ext uri="{D42A27DB-BD31-4B8C-83A1-F6EECF244321}">
-                <p14:modId xmlns:p14="http://schemas.microsoft.com/office/powerpoint/2010/main" val="3846863531"/>
+                <p14:modId xmlns:p14="http://schemas.microsoft.com/office/powerpoint/2010/main" val="1206398872"/>
               </p:ext>
             </p:extLst>
           </p:nvPr>
         </p:nvGraphicFramePr>
         <p:xfrm>
-          <a:off x="715963" y="1333500"/>
-          <a:ext cx="7612062" cy="5852160"/>
+          <a:off x="321680" y="1333500"/>
+          <a:ext cx="7612062" cy="5877942"/>
         </p:xfrm>
         <a:graphic>
           <a:graphicData uri="http://schemas.openxmlformats.org/drawingml/2006/table">
@@ -16667,7 +16775,7 @@
                     <a:bodyPr/>
                     <a:lstStyle/>
                     <a:p>
-                      <a:pPr marL="0" marR="0" lvl="0" indent="0" algn="l" defTabSz="914400" rtl="0" eaLnBrk="1" fontAlgn="base" latinLnBrk="0" hangingPunct="1">
+                      <a:pPr marL="342900" marR="0" lvl="0" indent="-342900" algn="l" defTabSz="914400" rtl="0" eaLnBrk="1" fontAlgn="base" latinLnBrk="0" hangingPunct="1">
                         <a:lnSpc>
                           <a:spcPct val="150000"/>
                         </a:lnSpc>
@@ -16679,12 +16787,12 @@
                         </a:spcAft>
                         <a:buClrTx/>
                         <a:buSzTx/>
-                        <a:buFont typeface="Wingdings" pitchFamily="2" charset="2"/>
-                        <a:buNone/>
+                        <a:buFont typeface="Arial" panose="020B0604020202020204" pitchFamily="34" charset="0"/>
+                        <a:buChar char="•"/>
                         <a:tabLst/>
                       </a:pPr>
                       <a:r>
-                        <a:rPr kumimoji="0" lang="en-US" sz="2400" b="0" i="0" u="none" strike="noStrike" cap="none" normalizeH="0" baseline="0" dirty="0">
+                        <a:rPr kumimoji="0" lang="en-US" sz="2200" b="0" i="0" u="none" strike="noStrike" cap="none" normalizeH="0" baseline="0" dirty="0">
                           <a:ln>
                             <a:noFill/>
                           </a:ln>
@@ -16698,7 +16806,7 @@
                         <a:t>Training</a:t>
                       </a:r>
                       <a:r>
-                        <a:rPr kumimoji="0" lang="zh-CN" altLang="en-US" sz="2400" b="0" i="0" u="none" strike="noStrike" cap="none" normalizeH="0" baseline="0" dirty="0">
+                        <a:rPr kumimoji="0" lang="zh-CN" altLang="en-US" sz="2200" b="0" i="0" u="none" strike="noStrike" cap="none" normalizeH="0" baseline="0" dirty="0">
                           <a:ln>
                             <a:noFill/>
                           </a:ln>
@@ -16711,7 +16819,7 @@
                         </a:rPr>
                         <a:t>介绍</a:t>
                       </a:r>
-                      <a:endParaRPr kumimoji="0" lang="en-US" altLang="zh-CN" sz="2400" b="0" i="0" u="none" strike="noStrike" cap="none" normalizeH="0" baseline="0" dirty="0">
+                      <a:endParaRPr kumimoji="0" lang="en-US" altLang="zh-CN" sz="2200" b="0" i="0" u="none" strike="noStrike" cap="none" normalizeH="0" baseline="0" dirty="0">
                         <a:ln>
                           <a:noFill/>
                         </a:ln>
@@ -16724,7 +16832,7 @@
                       </a:endParaRPr>
                     </a:p>
                     <a:p>
-                      <a:pPr marL="0" marR="0" lvl="0" indent="0" algn="l" defTabSz="914400" rtl="0" eaLnBrk="1" fontAlgn="base" latinLnBrk="0" hangingPunct="1">
+                      <a:pPr marL="342900" marR="0" lvl="0" indent="-342900" algn="l" defTabSz="914400" rtl="0" eaLnBrk="1" fontAlgn="base" latinLnBrk="0" hangingPunct="1">
                         <a:lnSpc>
                           <a:spcPct val="150000"/>
                         </a:lnSpc>
@@ -16736,12 +16844,12 @@
                         </a:spcAft>
                         <a:buClrTx/>
                         <a:buSzTx/>
-                        <a:buFont typeface="Wingdings" pitchFamily="2" charset="2"/>
-                        <a:buNone/>
+                        <a:buFont typeface="Arial" panose="020B0604020202020204" pitchFamily="34" charset="0"/>
+                        <a:buChar char="•"/>
                         <a:tabLst/>
                       </a:pPr>
                       <a:r>
-                        <a:rPr kumimoji="0" lang="en-US" altLang="zh-CN" sz="2400" b="0" i="0" u="none" strike="noStrike" cap="none" normalizeH="0" baseline="0" dirty="0">
+                        <a:rPr kumimoji="0" lang="en-US" altLang="zh-CN" sz="2200" b="0" i="0" u="none" strike="noStrike" cap="none" normalizeH="0" baseline="0" dirty="0">
                           <a:ln>
                             <a:noFill/>
                           </a:ln>
@@ -16755,7 +16863,7 @@
                         <a:t>Mobile App</a:t>
                       </a:r>
                       <a:r>
-                        <a:rPr kumimoji="0" lang="zh-CN" altLang="en-US" sz="2400" b="0" i="0" u="none" strike="noStrike" cap="none" normalizeH="0" baseline="0" dirty="0">
+                        <a:rPr kumimoji="0" lang="zh-CN" altLang="en-US" sz="2200" b="0" i="0" u="none" strike="noStrike" cap="none" normalizeH="0" baseline="0" dirty="0">
                           <a:ln>
                             <a:noFill/>
                           </a:ln>
@@ -16768,7 +16876,7 @@
                         </a:rPr>
                         <a:t>开发方式</a:t>
                       </a:r>
-                      <a:endParaRPr kumimoji="0" lang="en-US" sz="2400" b="0" i="0" u="none" strike="noStrike" cap="none" normalizeH="0" baseline="0" dirty="0">
+                      <a:endParaRPr kumimoji="0" lang="en-US" sz="2200" b="0" i="0" u="none" strike="noStrike" cap="none" normalizeH="0" baseline="0" dirty="0">
                         <a:ln>
                           <a:noFill/>
                         </a:ln>
@@ -16815,7 +16923,7 @@
                     <a:bodyPr/>
                     <a:lstStyle/>
                     <a:p>
-                      <a:pPr marL="0" marR="0" lvl="0" indent="0" algn="l" defTabSz="914400" rtl="0" eaLnBrk="1" fontAlgn="base" latinLnBrk="0" hangingPunct="1">
+                      <a:pPr marL="342900" marR="0" lvl="0" indent="-342900" algn="l" defTabSz="914400" rtl="0" eaLnBrk="1" fontAlgn="base" latinLnBrk="0" hangingPunct="1">
                         <a:lnSpc>
                           <a:spcPct val="150000"/>
                         </a:lnSpc>
@@ -16827,13 +16935,13 @@
                         </a:spcAft>
                         <a:buClrTx/>
                         <a:buSzTx/>
-                        <a:buFont typeface="Wingdings" pitchFamily="2" charset="2"/>
-                        <a:buNone/>
+                        <a:buFont typeface="Arial" panose="020B0604020202020204" pitchFamily="34" charset="0"/>
+                        <a:buChar char="•"/>
                         <a:tabLst/>
                         <a:defRPr/>
                       </a:pPr>
                       <a:r>
-                        <a:rPr kumimoji="0" lang="en-US" altLang="zh-CN" sz="2400" b="0" i="0" u="none" strike="noStrike" cap="none" normalizeH="0" baseline="0" dirty="0">
+                        <a:rPr kumimoji="0" lang="en-US" altLang="zh-CN" sz="2200" b="0" i="0" u="none" strike="noStrike" cap="none" normalizeH="0" baseline="0" dirty="0">
                           <a:ln>
                             <a:noFill/>
                           </a:ln>
@@ -16847,19 +16955,19 @@
                         <a:t>Hybrid</a:t>
                       </a:r>
                       <a:r>
-                        <a:rPr lang="ja-JP" altLang="en-US" sz="2400" dirty="0">
+                        <a:rPr lang="ja-JP" altLang="en-US" sz="2200" dirty="0">
                           <a:latin typeface="SimSun" panose="02010600030101010101" pitchFamily="2" charset="-122"/>
                           <a:ea typeface="SimSun" panose="02010600030101010101" pitchFamily="2" charset="-122"/>
                         </a:rPr>
                         <a:t>技术栈</a:t>
                       </a:r>
-                      <a:endParaRPr lang="en-US" altLang="ja-JP" sz="2400" dirty="0">
+                      <a:endParaRPr lang="en-US" altLang="ja-JP" sz="2200" dirty="0">
                         <a:latin typeface="SimSun" panose="02010600030101010101" pitchFamily="2" charset="-122"/>
                         <a:ea typeface="SimSun" panose="02010600030101010101" pitchFamily="2" charset="-122"/>
                       </a:endParaRPr>
                     </a:p>
                     <a:p>
-                      <a:pPr marL="0" marR="0" lvl="0" indent="0" algn="l" defTabSz="914400" rtl="0" eaLnBrk="1" fontAlgn="base" latinLnBrk="0" hangingPunct="1">
+                      <a:pPr marL="342900" marR="0" lvl="0" indent="-342900" algn="l" defTabSz="914400" rtl="0" eaLnBrk="1" fontAlgn="base" latinLnBrk="0" hangingPunct="1">
                         <a:lnSpc>
                           <a:spcPct val="150000"/>
                         </a:lnSpc>
@@ -16871,13 +16979,13 @@
                         </a:spcAft>
                         <a:buClrTx/>
                         <a:buSzTx/>
-                        <a:buFont typeface="Wingdings" pitchFamily="2" charset="2"/>
-                        <a:buNone/>
+                        <a:buFont typeface="Arial" panose="020B0604020202020204" pitchFamily="34" charset="0"/>
+                        <a:buChar char="•"/>
                         <a:tabLst/>
                         <a:defRPr/>
                       </a:pPr>
                       <a:r>
-                        <a:rPr kumimoji="0" lang="en-US" sz="2400" b="0" i="0" u="none" strike="noStrike" cap="none" normalizeH="0" baseline="0" dirty="0">
+                        <a:rPr kumimoji="0" lang="en-US" sz="2200" b="0" i="0" u="none" strike="noStrike" cap="none" normalizeH="0" baseline="0" dirty="0">
                           <a:ln>
                             <a:noFill/>
                           </a:ln>
@@ -16891,7 +16999,7 @@
                         <a:t>Angular</a:t>
                       </a:r>
                       <a:r>
-                        <a:rPr kumimoji="0" lang="zh-CN" altLang="en-US" sz="2400" b="0" i="0" u="none" strike="noStrike" cap="none" normalizeH="0" baseline="0" dirty="0">
+                        <a:rPr kumimoji="0" lang="zh-CN" altLang="en-US" sz="2200" b="0" i="0" u="none" strike="noStrike" cap="none" normalizeH="0" baseline="0" dirty="0">
                           <a:ln>
                             <a:noFill/>
                           </a:ln>
@@ -16904,7 +17012,7 @@
                         </a:rPr>
                         <a:t>发展回顾</a:t>
                       </a:r>
-                      <a:endParaRPr kumimoji="0" lang="en-US" altLang="zh-CN" sz="2400" b="0" i="0" u="none" strike="noStrike" cap="none" normalizeH="0" baseline="0" dirty="0">
+                      <a:endParaRPr kumimoji="0" lang="en-US" altLang="zh-CN" sz="2200" b="0" i="0" u="none" strike="noStrike" cap="none" normalizeH="0" baseline="0" dirty="0">
                         <a:ln>
                           <a:noFill/>
                         </a:ln>
@@ -16917,7 +17025,7 @@
                       </a:endParaRPr>
                     </a:p>
                     <a:p>
-                      <a:pPr marL="0" marR="0" lvl="0" indent="0" algn="l" defTabSz="914400" rtl="0" eaLnBrk="1" fontAlgn="base" latinLnBrk="0" hangingPunct="1">
+                      <a:pPr marL="342900" marR="0" lvl="0" indent="-342900" algn="l" defTabSz="914400" rtl="0" eaLnBrk="1" fontAlgn="base" latinLnBrk="0" hangingPunct="1">
                         <a:lnSpc>
                           <a:spcPct val="150000"/>
                         </a:lnSpc>
@@ -16929,13 +17037,13 @@
                         </a:spcAft>
                         <a:buClrTx/>
                         <a:buSzTx/>
-                        <a:buFont typeface="Wingdings" pitchFamily="2" charset="2"/>
-                        <a:buNone/>
+                        <a:buFont typeface="Arial" panose="020B0604020202020204" pitchFamily="34" charset="0"/>
+                        <a:buChar char="•"/>
                         <a:tabLst/>
                         <a:defRPr/>
                       </a:pPr>
                       <a:r>
-                        <a:rPr kumimoji="0" lang="zh-CN" altLang="en-US" sz="2400" b="0" i="0" u="none" strike="noStrike" cap="none" normalizeH="0" baseline="0" dirty="0">
+                        <a:rPr kumimoji="0" lang="zh-CN" altLang="en-US" sz="2200" b="0" i="0" u="none" strike="noStrike" cap="none" normalizeH="0" baseline="0" dirty="0">
                           <a:ln>
                             <a:noFill/>
                           </a:ln>
@@ -16948,7 +17056,7 @@
                         </a:rPr>
                         <a:t>开发环境搭建</a:t>
                       </a:r>
-                      <a:endParaRPr kumimoji="0" lang="en-US" altLang="zh-CN" sz="2400" b="0" i="0" u="none" strike="noStrike" cap="none" normalizeH="0" baseline="0" dirty="0">
+                      <a:endParaRPr kumimoji="0" lang="en-US" altLang="zh-CN" sz="2200" b="0" i="0" u="none" strike="noStrike" cap="none" normalizeH="0" baseline="0" dirty="0">
                         <a:ln>
                           <a:noFill/>
                         </a:ln>
@@ -16961,7 +17069,7 @@
                       </a:endParaRPr>
                     </a:p>
                     <a:p>
-                      <a:pPr marL="0" marR="0" lvl="0" indent="0" algn="l" defTabSz="914400" rtl="0" eaLnBrk="1" fontAlgn="base" latinLnBrk="0" hangingPunct="1">
+                      <a:pPr marL="342900" marR="0" lvl="0" indent="-342900" algn="l" defTabSz="914400" rtl="0" eaLnBrk="1" fontAlgn="base" latinLnBrk="0" hangingPunct="1">
                         <a:lnSpc>
                           <a:spcPct val="150000"/>
                         </a:lnSpc>
@@ -16973,13 +17081,13 @@
                         </a:spcAft>
                         <a:buClrTx/>
                         <a:buSzTx/>
-                        <a:buFont typeface="Wingdings" pitchFamily="2" charset="2"/>
-                        <a:buNone/>
+                        <a:buFont typeface="Arial" panose="020B0604020202020204" pitchFamily="34" charset="0"/>
+                        <a:buChar char="•"/>
                         <a:tabLst/>
                         <a:defRPr/>
                       </a:pPr>
                       <a:r>
-                        <a:rPr kumimoji="0" lang="zh-CN" altLang="en-US" sz="2400" b="0" i="0" u="none" strike="noStrike" cap="none" normalizeH="0" baseline="0" dirty="0">
+                        <a:rPr kumimoji="0" lang="zh-CN" altLang="en-US" sz="2200" b="0" i="0" u="none" strike="noStrike" cap="none" normalizeH="0" baseline="0" dirty="0">
                           <a:ln>
                             <a:noFill/>
                           </a:ln>
@@ -16992,7 +17100,7 @@
                         </a:rPr>
                         <a:t>作业与练习</a:t>
                       </a:r>
-                      <a:endParaRPr kumimoji="0" lang="en-US" sz="2400" b="0" i="0" u="none" strike="noStrike" cap="none" normalizeH="0" baseline="0" dirty="0">
+                      <a:endParaRPr kumimoji="0" lang="en-US" altLang="zh-CN" sz="2200" b="0" i="0" u="none" strike="noStrike" cap="none" normalizeH="0" baseline="0" dirty="0">
                         <a:ln>
                           <a:noFill/>
                         </a:ln>
@@ -17005,7 +17113,7 @@
                       </a:endParaRPr>
                     </a:p>
                     <a:p>
-                      <a:pPr marL="0" marR="0" lvl="0" indent="0" algn="l" defTabSz="914400" rtl="0" eaLnBrk="1" fontAlgn="base" latinLnBrk="0" hangingPunct="1">
+                      <a:pPr marL="342900" marR="0" lvl="0" indent="-342900" algn="l" defTabSz="914400" rtl="0" eaLnBrk="1" fontAlgn="base" latinLnBrk="0" hangingPunct="1">
                         <a:lnSpc>
                           <a:spcPct val="150000"/>
                         </a:lnSpc>
@@ -17017,11 +17125,44 @@
                         </a:spcAft>
                         <a:buClrTx/>
                         <a:buSzTx/>
-                        <a:buFont typeface="Wingdings" pitchFamily="2" charset="2"/>
-                        <a:buNone/>
+                        <a:buFont typeface="Arial" panose="020B0604020202020204" pitchFamily="34" charset="0"/>
+                        <a:buChar char="•"/>
+                        <a:tabLst/>
+                        <a:defRPr/>
+                      </a:pPr>
+                      <a:r>
+                        <a:rPr kumimoji="0" lang="en-US" sz="2200" b="0" i="0" u="none" strike="noStrike" cap="none" normalizeH="0" baseline="0" dirty="0">
+                          <a:ln>
+                            <a:noFill/>
+                          </a:ln>
+                          <a:solidFill>
+                            <a:srgbClr val="000000"/>
+                          </a:solidFill>
+                          <a:effectLst/>
+                          <a:latin typeface="SimSun" panose="02010600030101010101" pitchFamily="2" charset="-122"/>
+                          <a:ea typeface="SimSun" panose="02010600030101010101" pitchFamily="2" charset="-122"/>
+                        </a:rPr>
+                        <a:t>QA</a:t>
+                      </a:r>
+                    </a:p>
+                    <a:p>
+                      <a:pPr marL="342900" marR="0" lvl="0" indent="-342900" algn="l" defTabSz="914400" rtl="0" eaLnBrk="1" fontAlgn="base" latinLnBrk="0" hangingPunct="1">
+                        <a:lnSpc>
+                          <a:spcPct val="150000"/>
+                        </a:lnSpc>
+                        <a:spcBef>
+                          <a:spcPct val="0"/>
+                        </a:spcBef>
+                        <a:spcAft>
+                          <a:spcPct val="0"/>
+                        </a:spcAft>
+                        <a:buClrTx/>
+                        <a:buSzTx/>
+                        <a:buFont typeface="Arial" panose="020B0604020202020204" pitchFamily="34" charset="0"/>
+                        <a:buChar char="•"/>
                         <a:tabLst/>
                       </a:pPr>
-                      <a:endParaRPr kumimoji="0" lang="en-US" sz="2400" b="0" i="0" u="none" strike="noStrike" cap="none" normalizeH="0" baseline="0" dirty="0">
+                      <a:endParaRPr kumimoji="0" lang="en-US" sz="2200" b="0" i="0" u="none" strike="noStrike" cap="none" normalizeH="0" baseline="0" dirty="0">
                         <a:ln>
                           <a:noFill/>
                         </a:ln>
@@ -17708,6 +17849,20 @@
                 <a:latin typeface="SimSun" panose="02010600030101010101" pitchFamily="2" charset="-122"/>
                 <a:ea typeface="SimSun" panose="02010600030101010101" pitchFamily="2" charset="-122"/>
               </a:rPr>
+              <a:t>或</a:t>
+            </a:r>
+            <a:r>
+              <a:rPr lang="en-US" altLang="zh-CN" sz="1600" b="0" dirty="0">
+                <a:latin typeface="SimSun" panose="02010600030101010101" pitchFamily="2" charset="-122"/>
+                <a:ea typeface="SimSun" panose="02010600030101010101" pitchFamily="2" charset="-122"/>
+              </a:rPr>
+              <a:t>Angular Web App</a:t>
+            </a:r>
+            <a:r>
+              <a:rPr lang="zh-CN" altLang="en-US" sz="1600" b="0" dirty="0">
+                <a:latin typeface="SimSun" panose="02010600030101010101" pitchFamily="2" charset="-122"/>
+                <a:ea typeface="SimSun" panose="02010600030101010101" pitchFamily="2" charset="-122"/>
+              </a:rPr>
               <a:t>。</a:t>
             </a:r>
             <a:endParaRPr lang="en-US" altLang="zh-CN" sz="1600" b="0" dirty="0">
@@ -18269,14 +18424,14 @@
           <a:ln/>
           <a:extLst>
             <a:ext uri="{909E8E84-426E-40dd-AFC4-6F175D3DCCD1}">
-              <a14:hiddenFill xmlns="" xmlns:a14="http://schemas.microsoft.com/office/drawing/2010/main">
+              <a14:hiddenFill xmlns:a14="http://schemas.microsoft.com/office/drawing/2010/main" xmlns="">
                 <a:solidFill>
                   <a:srgbClr val="FFFFFF"/>
                 </a:solidFill>
               </a14:hiddenFill>
             </a:ext>
             <a:ext uri="{91240B29-F687-4f45-9708-019B960494DF}">
-              <a14:hiddenLine xmlns="" xmlns:a14="http://schemas.microsoft.com/office/drawing/2010/main" w="9525">
+              <a14:hiddenLine xmlns:a14="http://schemas.microsoft.com/office/drawing/2010/main" xmlns="" w="9525">
                 <a:solidFill>
                   <a:srgbClr val="000000"/>
                 </a:solidFill>
@@ -18286,7 +18441,7 @@
               </a14:hiddenLine>
             </a:ext>
             <a:ext uri="{AF507438-7753-43e0-B8FC-AC1667EBCBE1}">
-              <a14:hiddenEffects xmlns="" xmlns:a14="http://schemas.microsoft.com/office/drawing/2010/main">
+              <a14:hiddenEffects xmlns:a14="http://schemas.microsoft.com/office/drawing/2010/main" xmlns="">
                 <a:effectLst>
                   <a:outerShdw dist="35921" dir="2700000" algn="ctr" rotWithShape="0">
                     <a:srgbClr val="808080"/>
@@ -18606,14 +18761,14 @@
           <a:ln/>
           <a:extLst>
             <a:ext uri="{909E8E84-426E-40dd-AFC4-6F175D3DCCD1}">
-              <a14:hiddenFill xmlns="" xmlns:a14="http://schemas.microsoft.com/office/drawing/2010/main">
+              <a14:hiddenFill xmlns:a14="http://schemas.microsoft.com/office/drawing/2010/main" xmlns="">
                 <a:solidFill>
                   <a:srgbClr val="FFFFFF"/>
                 </a:solidFill>
               </a14:hiddenFill>
             </a:ext>
             <a:ext uri="{91240B29-F687-4f45-9708-019B960494DF}">
-              <a14:hiddenLine xmlns="" xmlns:a14="http://schemas.microsoft.com/office/drawing/2010/main" w="9525">
+              <a14:hiddenLine xmlns:a14="http://schemas.microsoft.com/office/drawing/2010/main" xmlns="" w="9525">
                 <a:solidFill>
                   <a:srgbClr val="000000"/>
                 </a:solidFill>
@@ -18623,7 +18778,7 @@
               </a14:hiddenLine>
             </a:ext>
             <a:ext uri="{AF507438-7753-43e0-B8FC-AC1667EBCBE1}">
-              <a14:hiddenEffects xmlns="" xmlns:a14="http://schemas.microsoft.com/office/drawing/2010/main">
+              <a14:hiddenEffects xmlns:a14="http://schemas.microsoft.com/office/drawing/2010/main" xmlns="">
                 <a:effectLst>
                   <a:outerShdw dist="35921" dir="2700000" algn="ctr" rotWithShape="0">
                     <a:srgbClr val="808080"/>
@@ -18776,14 +18931,14 @@
           <a:ln/>
           <a:extLst>
             <a:ext uri="{909E8E84-426E-40dd-AFC4-6F175D3DCCD1}">
-              <a14:hiddenFill xmlns="" xmlns:a14="http://schemas.microsoft.com/office/drawing/2010/main">
+              <a14:hiddenFill xmlns:a14="http://schemas.microsoft.com/office/drawing/2010/main" xmlns="">
                 <a:solidFill>
                   <a:srgbClr val="FFFFFF"/>
                 </a:solidFill>
               </a14:hiddenFill>
             </a:ext>
             <a:ext uri="{91240B29-F687-4f45-9708-019B960494DF}">
-              <a14:hiddenLine xmlns="" xmlns:a14="http://schemas.microsoft.com/office/drawing/2010/main" w="9525">
+              <a14:hiddenLine xmlns:a14="http://schemas.microsoft.com/office/drawing/2010/main" xmlns="" w="9525">
                 <a:solidFill>
                   <a:srgbClr val="000000"/>
                 </a:solidFill>
@@ -18793,7 +18948,7 @@
               </a14:hiddenLine>
             </a:ext>
             <a:ext uri="{AF507438-7753-43e0-B8FC-AC1667EBCBE1}">
-              <a14:hiddenEffects xmlns="" xmlns:a14="http://schemas.microsoft.com/office/drawing/2010/main">
+              <a14:hiddenEffects xmlns:a14="http://schemas.microsoft.com/office/drawing/2010/main" xmlns="">
                 <a:effectLst>
                   <a:outerShdw dist="35921" dir="2700000" algn="ctr" rotWithShape="0">
                     <a:srgbClr val="808080"/>
@@ -19145,14 +19300,14 @@
           <a:ln/>
           <a:extLst>
             <a:ext uri="{909E8E84-426E-40dd-AFC4-6F175D3DCCD1}">
-              <a14:hiddenFill xmlns="" xmlns:a14="http://schemas.microsoft.com/office/drawing/2010/main">
+              <a14:hiddenFill xmlns:a14="http://schemas.microsoft.com/office/drawing/2010/main" xmlns="">
                 <a:solidFill>
                   <a:srgbClr val="FFFFFF"/>
                 </a:solidFill>
               </a14:hiddenFill>
             </a:ext>
             <a:ext uri="{91240B29-F687-4f45-9708-019B960494DF}">
-              <a14:hiddenLine xmlns="" xmlns:a14="http://schemas.microsoft.com/office/drawing/2010/main" w="9525">
+              <a14:hiddenLine xmlns:a14="http://schemas.microsoft.com/office/drawing/2010/main" xmlns="" w="9525">
                 <a:solidFill>
                   <a:srgbClr val="000000"/>
                 </a:solidFill>
@@ -19162,7 +19317,7 @@
               </a14:hiddenLine>
             </a:ext>
             <a:ext uri="{AF507438-7753-43e0-B8FC-AC1667EBCBE1}">
-              <a14:hiddenEffects xmlns="" xmlns:a14="http://schemas.microsoft.com/office/drawing/2010/main">
+              <a14:hiddenEffects xmlns:a14="http://schemas.microsoft.com/office/drawing/2010/main" xmlns="">
                 <a:effectLst>
                   <a:outerShdw dist="35921" dir="2700000" algn="ctr" rotWithShape="0">
                     <a:srgbClr val="808080"/>
@@ -19450,14 +19605,14 @@
           <a:ln/>
           <a:extLst>
             <a:ext uri="{909E8E84-426E-40dd-AFC4-6F175D3DCCD1}">
-              <a14:hiddenFill xmlns="" xmlns:a14="http://schemas.microsoft.com/office/drawing/2010/main">
+              <a14:hiddenFill xmlns:a14="http://schemas.microsoft.com/office/drawing/2010/main" xmlns="">
                 <a:solidFill>
                   <a:srgbClr val="FFFFFF"/>
                 </a:solidFill>
               </a14:hiddenFill>
             </a:ext>
             <a:ext uri="{91240B29-F687-4f45-9708-019B960494DF}">
-              <a14:hiddenLine xmlns="" xmlns:a14="http://schemas.microsoft.com/office/drawing/2010/main" w="9525">
+              <a14:hiddenLine xmlns:a14="http://schemas.microsoft.com/office/drawing/2010/main" xmlns="" w="9525">
                 <a:solidFill>
                   <a:srgbClr val="000000"/>
                 </a:solidFill>
@@ -19467,7 +19622,7 @@
               </a14:hiddenLine>
             </a:ext>
             <a:ext uri="{AF507438-7753-43e0-B8FC-AC1667EBCBE1}">
-              <a14:hiddenEffects xmlns="" xmlns:a14="http://schemas.microsoft.com/office/drawing/2010/main">
+              <a14:hiddenEffects xmlns:a14="http://schemas.microsoft.com/office/drawing/2010/main" xmlns="">
                 <a:effectLst>
                   <a:outerShdw dist="35921" dir="2700000" algn="ctr" rotWithShape="0">
                     <a:srgbClr val="808080"/>
@@ -19595,14 +19750,14 @@
           <a:ln/>
           <a:extLst>
             <a:ext uri="{909E8E84-426E-40dd-AFC4-6F175D3DCCD1}">
-              <a14:hiddenFill xmlns="" xmlns:a14="http://schemas.microsoft.com/office/drawing/2010/main">
+              <a14:hiddenFill xmlns:a14="http://schemas.microsoft.com/office/drawing/2010/main" xmlns="">
                 <a:solidFill>
                   <a:srgbClr val="FFFFFF"/>
                 </a:solidFill>
               </a14:hiddenFill>
             </a:ext>
             <a:ext uri="{91240B29-F687-4f45-9708-019B960494DF}">
-              <a14:hiddenLine xmlns="" xmlns:a14="http://schemas.microsoft.com/office/drawing/2010/main" w="9525">
+              <a14:hiddenLine xmlns:a14="http://schemas.microsoft.com/office/drawing/2010/main" xmlns="" w="9525">
                 <a:solidFill>
                   <a:srgbClr val="000000"/>
                 </a:solidFill>
@@ -19612,7 +19767,7 @@
               </a14:hiddenLine>
             </a:ext>
             <a:ext uri="{AF507438-7753-43e0-B8FC-AC1667EBCBE1}">
-              <a14:hiddenEffects xmlns="" xmlns:a14="http://schemas.microsoft.com/office/drawing/2010/main">
+              <a14:hiddenEffects xmlns:a14="http://schemas.microsoft.com/office/drawing/2010/main" xmlns="">
                 <a:effectLst>
                   <a:outerShdw dist="35921" dir="2700000" algn="ctr" rotWithShape="0">
                     <a:srgbClr val="808080"/>
@@ -19952,14 +20107,14 @@
           <a:ln/>
           <a:extLst>
             <a:ext uri="{909E8E84-426E-40dd-AFC4-6F175D3DCCD1}">
-              <a14:hiddenFill xmlns="" xmlns:a14="http://schemas.microsoft.com/office/drawing/2010/main">
+              <a14:hiddenFill xmlns:a14="http://schemas.microsoft.com/office/drawing/2010/main" xmlns="">
                 <a:solidFill>
                   <a:srgbClr val="FFFFFF"/>
                 </a:solidFill>
               </a14:hiddenFill>
             </a:ext>
             <a:ext uri="{91240B29-F687-4f45-9708-019B960494DF}">
-              <a14:hiddenLine xmlns="" xmlns:a14="http://schemas.microsoft.com/office/drawing/2010/main" w="9525">
+              <a14:hiddenLine xmlns:a14="http://schemas.microsoft.com/office/drawing/2010/main" xmlns="" w="9525">
                 <a:solidFill>
                   <a:srgbClr val="000000"/>
                 </a:solidFill>
@@ -19969,7 +20124,7 @@
               </a14:hiddenLine>
             </a:ext>
             <a:ext uri="{AF507438-7753-43e0-B8FC-AC1667EBCBE1}">
-              <a14:hiddenEffects xmlns="" xmlns:a14="http://schemas.microsoft.com/office/drawing/2010/main">
+              <a14:hiddenEffects xmlns:a14="http://schemas.microsoft.com/office/drawing/2010/main" xmlns="">
                 <a:effectLst>
                   <a:outerShdw dist="35921" dir="2700000" algn="ctr" rotWithShape="0">
                     <a:srgbClr val="808080"/>
@@ -20293,14 +20448,14 @@
           <a:ln/>
           <a:extLst>
             <a:ext uri="{909E8E84-426E-40dd-AFC4-6F175D3DCCD1}">
-              <a14:hiddenFill xmlns="" xmlns:a14="http://schemas.microsoft.com/office/drawing/2010/main">
+              <a14:hiddenFill xmlns:a14="http://schemas.microsoft.com/office/drawing/2010/main" xmlns="">
                 <a:solidFill>
                   <a:srgbClr val="FFFFFF"/>
                 </a:solidFill>
               </a14:hiddenFill>
             </a:ext>
             <a:ext uri="{91240B29-F687-4f45-9708-019B960494DF}">
-              <a14:hiddenLine xmlns="" xmlns:a14="http://schemas.microsoft.com/office/drawing/2010/main" w="9525">
+              <a14:hiddenLine xmlns:a14="http://schemas.microsoft.com/office/drawing/2010/main" xmlns="" w="9525">
                 <a:solidFill>
                   <a:srgbClr val="000000"/>
                 </a:solidFill>
@@ -20310,7 +20465,7 @@
               </a14:hiddenLine>
             </a:ext>
             <a:ext uri="{AF507438-7753-43e0-B8FC-AC1667EBCBE1}">
-              <a14:hiddenEffects xmlns="" xmlns:a14="http://schemas.microsoft.com/office/drawing/2010/main">
+              <a14:hiddenEffects xmlns:a14="http://schemas.microsoft.com/office/drawing/2010/main" xmlns="">
                 <a:effectLst>
                   <a:outerShdw dist="35921" dir="2700000" algn="ctr" rotWithShape="0">
                     <a:srgbClr val="808080"/>
@@ -20461,14 +20616,14 @@
           <a:ln/>
           <a:extLst>
             <a:ext uri="{909E8E84-426E-40dd-AFC4-6F175D3DCCD1}">
-              <a14:hiddenFill xmlns="" xmlns:a14="http://schemas.microsoft.com/office/drawing/2010/main">
+              <a14:hiddenFill xmlns:a14="http://schemas.microsoft.com/office/drawing/2010/main" xmlns="">
                 <a:solidFill>
                   <a:srgbClr val="FFFFFF"/>
                 </a:solidFill>
               </a14:hiddenFill>
             </a:ext>
             <a:ext uri="{91240B29-F687-4f45-9708-019B960494DF}">
-              <a14:hiddenLine xmlns="" xmlns:a14="http://schemas.microsoft.com/office/drawing/2010/main" w="9525">
+              <a14:hiddenLine xmlns:a14="http://schemas.microsoft.com/office/drawing/2010/main" xmlns="" w="9525">
                 <a:solidFill>
                   <a:srgbClr val="000000"/>
                 </a:solidFill>
@@ -20478,7 +20633,7 @@
               </a14:hiddenLine>
             </a:ext>
             <a:ext uri="{AF507438-7753-43e0-B8FC-AC1667EBCBE1}">
-              <a14:hiddenEffects xmlns="" xmlns:a14="http://schemas.microsoft.com/office/drawing/2010/main">
+              <a14:hiddenEffects xmlns:a14="http://schemas.microsoft.com/office/drawing/2010/main" xmlns="">
                 <a:effectLst>
                   <a:outerShdw dist="35921" dir="2700000" algn="ctr" rotWithShape="0">
                     <a:srgbClr val="808080"/>
@@ -20641,6 +20796,64 @@
           <a:chExt cx="0" cy="0"/>
         </a:xfrm>
       </p:grpSpPr>
+      <p:sp>
+        <p:nvSpPr>
+          <p:cNvPr id="2" name="Rectangle 1"/>
+          <p:cNvSpPr/>
+          <p:nvPr/>
+        </p:nvSpPr>
+        <p:spPr>
+          <a:xfrm>
+            <a:off x="3106799" y="2249104"/>
+            <a:ext cx="2650921" cy="2988474"/>
+          </a:xfrm>
+          <a:prstGeom prst="rect">
+            <a:avLst/>
+          </a:prstGeom>
+          <a:solidFill>
+            <a:schemeClr val="accent6">
+              <a:lumMod val="60000"/>
+              <a:lumOff val="40000"/>
+            </a:schemeClr>
+          </a:solidFill>
+          <a:ln>
+            <a:solidFill>
+              <a:schemeClr val="accent6">
+                <a:lumMod val="40000"/>
+                <a:lumOff val="60000"/>
+              </a:schemeClr>
+            </a:solidFill>
+          </a:ln>
+        </p:spPr>
+        <p:style>
+          <a:lnRef idx="2">
+            <a:schemeClr val="accent1">
+              <a:shade val="50000"/>
+            </a:schemeClr>
+          </a:lnRef>
+          <a:fillRef idx="1">
+            <a:schemeClr val="accent1"/>
+          </a:fillRef>
+          <a:effectRef idx="0">
+            <a:schemeClr val="accent1"/>
+          </a:effectRef>
+          <a:fontRef idx="minor">
+            <a:schemeClr val="lt1"/>
+          </a:fontRef>
+        </p:style>
+        <p:txBody>
+          <a:bodyPr rtlCol="0" anchor="ctr"/>
+          <a:lstStyle/>
+          <a:p>
+            <a:pPr algn="ctr"/>
+            <a:endParaRPr lang="en-US" dirty="0">
+              <a:highlight>
+                <a:srgbClr val="00FFFF"/>
+              </a:highlight>
+            </a:endParaRPr>
+          </a:p>
+        </p:txBody>
+      </p:sp>
       <p:sp>
         <p:nvSpPr>
           <p:cNvPr id="5122" name="Rectangle 2"/>
@@ -20910,7 +21123,7 @@
         <p:spPr>
           <a:xfrm>
             <a:off x="1881259" y="2254131"/>
-            <a:ext cx="1472618" cy="1248212"/>
+            <a:ext cx="1225540" cy="1248212"/>
           </a:xfrm>
           <a:prstGeom prst="rect">
             <a:avLst/>
@@ -24339,22 +24552,6 @@
 </file>
 
 <file path=customXml/item2.xml><?xml version="1.0" encoding="utf-8"?>
-<p:properties xmlns:p="http://schemas.microsoft.com/office/2006/metadata/properties" xmlns:xsi="http://www.w3.org/2001/XMLSchema-instance" xmlns:pc="http://schemas.microsoft.com/office/infopath/2007/PartnerControls">
-  <documentManagement>
-    <TemplateUrl xmlns="http://schemas.microsoft.com/sharepoint/v3" xsi:nil="true"/>
-    <_SourceUrl xmlns="http://schemas.microsoft.com/sharepoint/v3" xsi:nil="true"/>
-    <Comments0 xmlns="C6B13D8A-F6C8-4777-9906-93DFDA163C9A" xsi:nil="true"/>
-    <xd_ProgID xmlns="http://schemas.microsoft.com/sharepoint/v3" xsi:nil="true"/>
-    <test xmlns="C6B13D8A-F6C8-4777-9906-93DFDA163C9A" xsi:nil="true"/>
-    <Order xmlns="http://schemas.microsoft.com/sharepoint/v3" xsi:nil="true"/>
-    <_SharedFileIndex xmlns="http://schemas.microsoft.com/sharepoint/v3" xsi:nil="true"/>
-    <MetaInfo xmlns="http://schemas.microsoft.com/sharepoint/v3" xsi:nil="true"/>
-    <ContentTypeId xmlns="http://schemas.microsoft.com/sharepoint/v3">0x0101008A3DB1C6C8F67747990693DFDA163C9A</ContentTypeId>
-  </documentManagement>
-</p:properties>
-</file>
-
-<file path=customXml/item3.xml><?xml version="1.0" encoding="utf-8"?>
 <ct:contentTypeSchema xmlns:ct="http://schemas.microsoft.com/office/2006/metadata/contentType" xmlns:ma="http://schemas.microsoft.com/office/2006/metadata/properties/metaAttributes" ct:_="" ma:_="" ma:contentTypeName="Document" ma:contentTypeID="0x0101008A3DB1C6C8F67747990693DFDA163C9A" ma:contentTypeVersion="0" ma:contentTypeDescription="Create a new document." ma:contentTypeScope="" ma:versionID="c53e8d4c718320ba5c01db3429b48e01">
   <xsd:schema xmlns:xsd="http://www.w3.org/2001/XMLSchema" xmlns:xs="http://www.w3.org/2001/XMLSchema" xmlns:p="http://schemas.microsoft.com/office/2006/metadata/properties" xmlns:ns1="http://schemas.microsoft.com/sharepoint/v3" xmlns:ns2="C6B13D8A-F6C8-4777-9906-93DFDA163C9A" targetNamespace="http://schemas.microsoft.com/office/2006/metadata/properties" ma:root="true" ma:fieldsID="10d7d5cf4be4c05f12ebb16474ba6c35" ns1:_="" ns2:_="">
     <xsd:import namespace="http://schemas.microsoft.com/sharepoint/v3"/>
@@ -24825,6 +25022,22 @@
 </ct:contentTypeSchema>
 </file>
 
+<file path=customXml/item3.xml><?xml version="1.0" encoding="utf-8"?>
+<p:properties xmlns:p="http://schemas.microsoft.com/office/2006/metadata/properties" xmlns:xsi="http://www.w3.org/2001/XMLSchema-instance" xmlns:pc="http://schemas.microsoft.com/office/infopath/2007/PartnerControls">
+  <documentManagement>
+    <TemplateUrl xmlns="http://schemas.microsoft.com/sharepoint/v3" xsi:nil="true"/>
+    <_SourceUrl xmlns="http://schemas.microsoft.com/sharepoint/v3" xsi:nil="true"/>
+    <Comments0 xmlns="C6B13D8A-F6C8-4777-9906-93DFDA163C9A" xsi:nil="true"/>
+    <xd_ProgID xmlns="http://schemas.microsoft.com/sharepoint/v3" xsi:nil="true"/>
+    <test xmlns="C6B13D8A-F6C8-4777-9906-93DFDA163C9A" xsi:nil="true"/>
+    <Order xmlns="http://schemas.microsoft.com/sharepoint/v3" xsi:nil="true"/>
+    <_SharedFileIndex xmlns="http://schemas.microsoft.com/sharepoint/v3" xsi:nil="true"/>
+    <MetaInfo xmlns="http://schemas.microsoft.com/sharepoint/v3" xsi:nil="true"/>
+    <ContentTypeId xmlns="http://schemas.microsoft.com/sharepoint/v3">0x0101008A3DB1C6C8F67747990693DFDA163C9A</ContentTypeId>
+  </documentManagement>
+</p:properties>
+</file>
+
 <file path=customXml/itemProps1.xml><?xml version="1.0" encoding="utf-8"?>
 <ds:datastoreItem xmlns:ds="http://schemas.openxmlformats.org/officeDocument/2006/customXml" ds:itemID="{6268566E-43AA-4A68-BD58-84AB4DF5B82A}">
   <ds:schemaRefs>
@@ -24834,17 +25047,6 @@
 </file>
 
 <file path=customXml/itemProps2.xml><?xml version="1.0" encoding="utf-8"?>
-<ds:datastoreItem xmlns:ds="http://schemas.openxmlformats.org/officeDocument/2006/customXml" ds:itemID="{F59E41AE-6836-4572-AAEF-EE3E09D690B6}">
-  <ds:schemaRefs>
-    <ds:schemaRef ds:uri="http://schemas.microsoft.com/office/2006/metadata/properties"/>
-    <ds:schemaRef ds:uri="http://schemas.microsoft.com/office/infopath/2007/PartnerControls"/>
-    <ds:schemaRef ds:uri="http://schemas.microsoft.com/sharepoint/v3"/>
-    <ds:schemaRef ds:uri="C6B13D8A-F6C8-4777-9906-93DFDA163C9A"/>
-  </ds:schemaRefs>
-</ds:datastoreItem>
-</file>
-
-<file path=customXml/itemProps3.xml><?xml version="1.0" encoding="utf-8"?>
 <ds:datastoreItem xmlns:ds="http://schemas.openxmlformats.org/officeDocument/2006/customXml" ds:itemID="{CC4C9FB6-25E4-4D1F-A1E8-D3497EBEE75E}">
   <ds:schemaRefs>
     <ds:schemaRef ds:uri="http://schemas.microsoft.com/office/2006/metadata/contentType"/>
@@ -24861,4 +25063,15 @@
     <ds:schemaRef ds:uri="http://schemas.microsoft.com/internal/obd"/>
   </ds:schemaRefs>
 </ds:datastoreItem>
+</file>
+
+<file path=customXml/itemProps3.xml><?xml version="1.0" encoding="utf-8"?>
+<ds:datastoreItem xmlns:ds="http://schemas.openxmlformats.org/officeDocument/2006/customXml" ds:itemID="{F59E41AE-6836-4572-AAEF-EE3E09D690B6}">
+  <ds:schemaRefs>
+    <ds:schemaRef ds:uri="http://schemas.microsoft.com/office/2006/metadata/properties"/>
+    <ds:schemaRef ds:uri="http://schemas.microsoft.com/office/infopath/2007/PartnerControls"/>
+    <ds:schemaRef ds:uri="http://schemas.microsoft.com/sharepoint/v3"/>
+    <ds:schemaRef ds:uri="C6B13D8A-F6C8-4777-9906-93DFDA163C9A"/>
+  </ds:schemaRefs>
+</ds:datastoreItem>
 </file>
</xml_diff>